<commit_message>
Added slide with Wikipedia screenshot.
</commit_message>
<xml_diff>
--- a/presentation1.pptx
+++ b/presentation1.pptx
@@ -5,16 +5,17 @@
     <p:sldMasterId id="2147483748" r:id="rId1"/>
   </p:sldMasterIdLst>
   <p:notesMasterIdLst>
-    <p:notesMasterId r:id="rId9"/>
+    <p:notesMasterId r:id="rId10"/>
   </p:notesMasterIdLst>
   <p:sldIdLst>
     <p:sldId id="256" r:id="rId2"/>
     <p:sldId id="257" r:id="rId3"/>
     <p:sldId id="258" r:id="rId4"/>
     <p:sldId id="259" r:id="rId5"/>
-    <p:sldId id="260" r:id="rId6"/>
-    <p:sldId id="261" r:id="rId7"/>
-    <p:sldId id="262" r:id="rId8"/>
+    <p:sldId id="263" r:id="rId6"/>
+    <p:sldId id="260" r:id="rId7"/>
+    <p:sldId id="261" r:id="rId8"/>
+    <p:sldId id="262" r:id="rId9"/>
   </p:sldIdLst>
   <p:sldSz cx="9144000" cy="6858000" type="screen4x3"/>
   <p:notesSz cx="6858000" cy="9144000"/>
@@ -113,6 +114,11 @@
       </a:defRPr>
     </a:lvl9pPr>
   </p:defaultTextStyle>
+  <p:extLst>
+    <p:ext uri="{EFAFB233-063F-42B5-8137-9DF3F51BA10A}">
+      <p15:sldGuideLst xmlns:p15="http://schemas.microsoft.com/office/powerpoint/2012/main"/>
+    </p:ext>
+  </p:extLst>
 </p:presentation>
 </file>
 
@@ -4965,6 +4971,149 @@
           <a:p>
             <a:r>
               <a:rPr lang="en-US" dirty="0" smtClean="0"/>
+              <a:t>Motivation</a:t>
+            </a:r>
+            <a:endParaRPr lang="en-US" dirty="0"/>
+          </a:p>
+        </p:txBody>
+      </p:sp>
+      <p:sp>
+        <p:nvSpPr>
+          <p:cNvPr id="3" name="Content Placeholder 2"/>
+          <p:cNvSpPr>
+            <a:spLocks noGrp="1"/>
+          </p:cNvSpPr>
+          <p:nvPr>
+            <p:ph idx="1"/>
+          </p:nvPr>
+        </p:nvSpPr>
+        <p:spPr/>
+        <p:txBody>
+          <a:bodyPr/>
+          <a:lstStyle/>
+          <a:p>
+            <a:pPr>
+              <a:buClrTx/>
+              <a:buFont typeface="Wingdings" panose="05000000000000000000" pitchFamily="2" charset="2"/>
+              <a:buChar char="§"/>
+            </a:pPr>
+            <a:r>
+              <a:rPr lang="en-US" dirty="0" smtClean="0"/>
+              <a:t> Wikipedia’s category structure is likely to be more relevant to users’ queries than </a:t>
+            </a:r>
+            <a:r>
+              <a:rPr lang="en-US" dirty="0" err="1" smtClean="0"/>
+              <a:t>WordNet’s</a:t>
+            </a:r>
+            <a:r>
+              <a:rPr lang="en-US" dirty="0" smtClean="0"/>
+              <a:t> hierarchy</a:t>
+            </a:r>
+            <a:endParaRPr lang="en-US" dirty="0"/>
+          </a:p>
+        </p:txBody>
+      </p:sp>
+      <p:pic>
+        <p:nvPicPr>
+          <p:cNvPr id="4" name="Picture 3"/>
+          <p:cNvPicPr>
+            <a:picLocks noChangeAspect="1"/>
+          </p:cNvPicPr>
+          <p:nvPr/>
+        </p:nvPicPr>
+        <p:blipFill>
+          <a:blip r:embed="rId2"/>
+          <a:stretch>
+            <a:fillRect/>
+          </a:stretch>
+        </p:blipFill>
+        <p:spPr>
+          <a:xfrm>
+            <a:off x="1675446" y="2497244"/>
+            <a:ext cx="5838825" cy="3371850"/>
+          </a:xfrm>
+          <a:prstGeom prst="rect">
+            <a:avLst/>
+          </a:prstGeom>
+        </p:spPr>
+      </p:pic>
+      <p:sp>
+        <p:nvSpPr>
+          <p:cNvPr id="5" name="TextBox 4"/>
+          <p:cNvSpPr txBox="1"/>
+          <p:nvPr/>
+        </p:nvSpPr>
+        <p:spPr>
+          <a:xfrm>
+            <a:off x="2575908" y="5977467"/>
+            <a:ext cx="4037900" cy="338554"/>
+          </a:xfrm>
+          <a:prstGeom prst="rect">
+            <a:avLst/>
+          </a:prstGeom>
+          <a:noFill/>
+        </p:spPr>
+        <p:txBody>
+          <a:bodyPr wrap="none" rtlCol="0">
+            <a:spAutoFit/>
+          </a:bodyPr>
+          <a:lstStyle/>
+          <a:p>
+            <a:r>
+              <a:rPr lang="en-US" sz="1600" dirty="0" smtClean="0"/>
+              <a:t>Wikipedia’s disambiguation page for “daffodil”</a:t>
+            </a:r>
+            <a:endParaRPr lang="en-US" sz="1600" dirty="0"/>
+          </a:p>
+        </p:txBody>
+      </p:sp>
+    </p:spTree>
+    <p:extLst>
+      <p:ext uri="{BB962C8B-B14F-4D97-AF65-F5344CB8AC3E}">
+        <p14:creationId xmlns:p14="http://schemas.microsoft.com/office/powerpoint/2010/main" val="2108606723"/>
+      </p:ext>
+    </p:extLst>
+  </p:cSld>
+  <p:clrMapOvr>
+    <a:masterClrMapping/>
+  </p:clrMapOvr>
+</p:sld>
+</file>
+
+<file path=ppt/slides/slide6.xml><?xml version="1.0" encoding="utf-8"?>
+<p:sld xmlns:a="http://schemas.openxmlformats.org/drawingml/2006/main" xmlns:r="http://schemas.openxmlformats.org/officeDocument/2006/relationships" xmlns:p="http://schemas.openxmlformats.org/presentationml/2006/main">
+  <p:cSld>
+    <p:spTree>
+      <p:nvGrpSpPr>
+        <p:cNvPr id="1" name=""/>
+        <p:cNvGrpSpPr/>
+        <p:nvPr/>
+      </p:nvGrpSpPr>
+      <p:grpSpPr>
+        <a:xfrm>
+          <a:off x="0" y="0"/>
+          <a:ext cx="0" cy="0"/>
+          <a:chOff x="0" y="0"/>
+          <a:chExt cx="0" cy="0"/>
+        </a:xfrm>
+      </p:grpSpPr>
+      <p:sp>
+        <p:nvSpPr>
+          <p:cNvPr id="2" name="Title 1"/>
+          <p:cNvSpPr>
+            <a:spLocks noGrp="1"/>
+          </p:cNvSpPr>
+          <p:nvPr>
+            <p:ph type="title"/>
+          </p:nvPr>
+        </p:nvSpPr>
+        <p:spPr/>
+        <p:txBody>
+          <a:bodyPr/>
+          <a:lstStyle/>
+          <a:p>
+            <a:r>
+              <a:rPr lang="en-US" dirty="0" smtClean="0"/>
               <a:t>Goal</a:t>
             </a:r>
             <a:endParaRPr lang="en-US" dirty="0"/>
@@ -5036,7 +5185,7 @@
 </p:sld>
 </file>
 
-<file path=ppt/slides/slide6.xml><?xml version="1.0" encoding="utf-8"?>
+<file path=ppt/slides/slide7.xml><?xml version="1.0" encoding="utf-8"?>
 <p:sld xmlns:a="http://schemas.openxmlformats.org/drawingml/2006/main" xmlns:r="http://schemas.openxmlformats.org/officeDocument/2006/relationships" xmlns:p="http://schemas.openxmlformats.org/presentationml/2006/main">
   <p:cSld>
     <p:spTree>
@@ -5195,7 +5344,7 @@
 </p:sld>
 </file>
 
-<file path=ppt/slides/slide7.xml><?xml version="1.0" encoding="utf-8"?>
+<file path=ppt/slides/slide8.xml><?xml version="1.0" encoding="utf-8"?>
 <p:sld xmlns:a="http://schemas.openxmlformats.org/drawingml/2006/main" xmlns:r="http://schemas.openxmlformats.org/officeDocument/2006/relationships" xmlns:p="http://schemas.openxmlformats.org/presentationml/2006/main">
   <p:cSld>
     <p:spTree>

</xml_diff>